<commit_message>
03. HTML Forms and Frames
</commit_message>
<xml_diff>
--- a/02A. HTML Fundamentals/03. HTML Forms and Frames/03. HTML Forms and Frames.pptx
+++ b/02A. HTML Fundamentals/03. HTML Forms and Frames/03. HTML Forms and Frames.pptx
@@ -260,7 +260,7 @@
           <a:p>
             <a:fld id="{9EC5837B-4546-4D10-8D00-9624B877B2AC}" type="datetimeFigureOut">
               <a:rPr lang="bg-BG" smtClean="0"/>
-              <a:t>07.03.2019</a:t>
+              <a:t>08.03.2019</a:t>
             </a:fld>
             <a:endParaRPr lang="bg-BG"/>
           </a:p>
@@ -2189,7 +2189,7 @@
           <a:p>
             <a:fld id="{6BC89E96-04EE-4B79-B25B-67640F4B36D2}" type="datetimeFigureOut">
               <a:rPr lang="bg-BG" smtClean="0"/>
-              <a:t>07.03.2019</a:t>
+              <a:t>08.03.2019</a:t>
             </a:fld>
             <a:endParaRPr lang="bg-BG"/>
           </a:p>
@@ -2389,7 +2389,7 @@
           <a:p>
             <a:fld id="{6BC89E96-04EE-4B79-B25B-67640F4B36D2}" type="datetimeFigureOut">
               <a:rPr lang="bg-BG" smtClean="0"/>
-              <a:t>07.03.2019</a:t>
+              <a:t>08.03.2019</a:t>
             </a:fld>
             <a:endParaRPr lang="bg-BG"/>
           </a:p>
@@ -2599,7 +2599,7 @@
           <a:p>
             <a:fld id="{6BC89E96-04EE-4B79-B25B-67640F4B36D2}" type="datetimeFigureOut">
               <a:rPr lang="bg-BG" smtClean="0"/>
-              <a:t>07.03.2019</a:t>
+              <a:t>08.03.2019</a:t>
             </a:fld>
             <a:endParaRPr lang="bg-BG"/>
           </a:p>
@@ -2799,7 +2799,7 @@
           <a:p>
             <a:fld id="{6BC89E96-04EE-4B79-B25B-67640F4B36D2}" type="datetimeFigureOut">
               <a:rPr lang="bg-BG" smtClean="0"/>
-              <a:t>07.03.2019</a:t>
+              <a:t>08.03.2019</a:t>
             </a:fld>
             <a:endParaRPr lang="bg-BG"/>
           </a:p>
@@ -3075,7 +3075,7 @@
           <a:p>
             <a:fld id="{6BC89E96-04EE-4B79-B25B-67640F4B36D2}" type="datetimeFigureOut">
               <a:rPr lang="bg-BG" smtClean="0"/>
-              <a:t>07.03.2019</a:t>
+              <a:t>08.03.2019</a:t>
             </a:fld>
             <a:endParaRPr lang="bg-BG"/>
           </a:p>
@@ -3343,7 +3343,7 @@
           <a:p>
             <a:fld id="{6BC89E96-04EE-4B79-B25B-67640F4B36D2}" type="datetimeFigureOut">
               <a:rPr lang="bg-BG" smtClean="0"/>
-              <a:t>07.03.2019</a:t>
+              <a:t>08.03.2019</a:t>
             </a:fld>
             <a:endParaRPr lang="bg-BG"/>
           </a:p>
@@ -3758,7 +3758,7 @@
           <a:p>
             <a:fld id="{6BC89E96-04EE-4B79-B25B-67640F4B36D2}" type="datetimeFigureOut">
               <a:rPr lang="bg-BG" smtClean="0"/>
-              <a:t>07.03.2019</a:t>
+              <a:t>08.03.2019</a:t>
             </a:fld>
             <a:endParaRPr lang="bg-BG"/>
           </a:p>
@@ -3900,7 +3900,7 @@
           <a:p>
             <a:fld id="{6BC89E96-04EE-4B79-B25B-67640F4B36D2}" type="datetimeFigureOut">
               <a:rPr lang="bg-BG" smtClean="0"/>
-              <a:t>07.03.2019</a:t>
+              <a:t>08.03.2019</a:t>
             </a:fld>
             <a:endParaRPr lang="bg-BG"/>
           </a:p>
@@ -4013,7 +4013,7 @@
           <a:p>
             <a:fld id="{6BC89E96-04EE-4B79-B25B-67640F4B36D2}" type="datetimeFigureOut">
               <a:rPr lang="bg-BG" smtClean="0"/>
-              <a:t>07.03.2019</a:t>
+              <a:t>08.03.2019</a:t>
             </a:fld>
             <a:endParaRPr lang="bg-BG"/>
           </a:p>
@@ -4326,7 +4326,7 @@
           <a:p>
             <a:fld id="{6BC89E96-04EE-4B79-B25B-67640F4B36D2}" type="datetimeFigureOut">
               <a:rPr lang="bg-BG" smtClean="0"/>
-              <a:t>07.03.2019</a:t>
+              <a:t>08.03.2019</a:t>
             </a:fld>
             <a:endParaRPr lang="bg-BG"/>
           </a:p>
@@ -4615,7 +4615,7 @@
           <a:p>
             <a:fld id="{6BC89E96-04EE-4B79-B25B-67640F4B36D2}" type="datetimeFigureOut">
               <a:rPr lang="bg-BG" smtClean="0"/>
-              <a:t>07.03.2019</a:t>
+              <a:t>08.03.2019</a:t>
             </a:fld>
             <a:endParaRPr lang="bg-BG"/>
           </a:p>
@@ -4858,7 +4858,7 @@
           <a:p>
             <a:fld id="{6BC89E96-04EE-4B79-B25B-67640F4B36D2}" type="datetimeFigureOut">
               <a:rPr lang="bg-BG" smtClean="0"/>
-              <a:t>07.03.2019</a:t>
+              <a:t>08.03.2019</a:t>
             </a:fld>
             <a:endParaRPr lang="bg-BG"/>
           </a:p>
@@ -19717,7 +19717,73 @@
                 <a:latin typeface="Source Sans Pro" panose="020B0503030403020204" pitchFamily="34" charset="0"/>
                 <a:ea typeface="Source Sans Pro" panose="020B0503030403020204" pitchFamily="34" charset="0"/>
               </a:rPr>
-              <a:t>Buttons for interactions like "Register", "Login", "Search"</a:t>
+              <a:t>Buttons for interactions like "</a:t>
+            </a:r>
+            <a:r>
+              <a:rPr lang="en-US" sz="2400" dirty="0">
+                <a:solidFill>
+                  <a:srgbClr val="F3BE60"/>
+                </a:solidFill>
+                <a:latin typeface="Source Sans Pro" panose="020B0503030403020204" pitchFamily="34" charset="0"/>
+                <a:ea typeface="Source Sans Pro" panose="020B0503030403020204" pitchFamily="34" charset="0"/>
+              </a:rPr>
+              <a:t>Register</a:t>
+            </a:r>
+            <a:r>
+              <a:rPr lang="en-US" sz="2400" dirty="0">
+                <a:solidFill>
+                  <a:schemeClr val="accent1">
+                    <a:lumMod val="75000"/>
+                  </a:schemeClr>
+                </a:solidFill>
+                <a:latin typeface="Source Sans Pro" panose="020B0503030403020204" pitchFamily="34" charset="0"/>
+                <a:ea typeface="Source Sans Pro" panose="020B0503030403020204" pitchFamily="34" charset="0"/>
+              </a:rPr>
+              <a:t>", "</a:t>
+            </a:r>
+            <a:r>
+              <a:rPr lang="en-US" sz="2400" dirty="0">
+                <a:solidFill>
+                  <a:srgbClr val="F3BE60"/>
+                </a:solidFill>
+                <a:latin typeface="Source Sans Pro" panose="020B0503030403020204" pitchFamily="34" charset="0"/>
+                <a:ea typeface="Source Sans Pro" panose="020B0503030403020204" pitchFamily="34" charset="0"/>
+              </a:rPr>
+              <a:t>Login</a:t>
+            </a:r>
+            <a:r>
+              <a:rPr lang="en-US" sz="2400" dirty="0">
+                <a:solidFill>
+                  <a:schemeClr val="accent1">
+                    <a:lumMod val="75000"/>
+                  </a:schemeClr>
+                </a:solidFill>
+                <a:latin typeface="Source Sans Pro" panose="020B0503030403020204" pitchFamily="34" charset="0"/>
+                <a:ea typeface="Source Sans Pro" panose="020B0503030403020204" pitchFamily="34" charset="0"/>
+              </a:rPr>
+              <a:t>", "</a:t>
+            </a:r>
+            <a:r>
+              <a:rPr lang="en-US" sz="2400" dirty="0">
+                <a:solidFill>
+                  <a:srgbClr val="F3BE60"/>
+                </a:solidFill>
+                <a:latin typeface="Source Sans Pro" panose="020B0503030403020204" pitchFamily="34" charset="0"/>
+                <a:ea typeface="Source Sans Pro" panose="020B0503030403020204" pitchFamily="34" charset="0"/>
+              </a:rPr>
+              <a:t>Search</a:t>
+            </a:r>
+            <a:r>
+              <a:rPr lang="en-US" sz="2400" dirty="0">
+                <a:solidFill>
+                  <a:schemeClr val="accent1">
+                    <a:lumMod val="75000"/>
+                  </a:schemeClr>
+                </a:solidFill>
+                <a:latin typeface="Source Sans Pro" panose="020B0503030403020204" pitchFamily="34" charset="0"/>
+                <a:ea typeface="Source Sans Pro" panose="020B0503030403020204" pitchFamily="34" charset="0"/>
+              </a:rPr>
+              <a:t>"</a:t>
             </a:r>
           </a:p>
           <a:p>

</xml_diff>